<commit_message>
Update infrastructure and app names, add network diagram, rename deployment script
</commit_message>
<xml_diff>
--- a/docs/Infrastructure as Code.pptx
+++ b/docs/Infrastructure as Code.pptx
@@ -8860,7 +8860,7 @@
         <p:spPr>
           <a:xfrm>
             <a:off x="2589213" y="4777379"/>
-            <a:ext cx="8915399" cy="1126283"/>
+            <a:ext cx="8915399" cy="701363"/>
           </a:xfrm>
         </p:spPr>
         <p:txBody>
@@ -8877,10 +8877,7 @@
           </a:p>
           <a:p>
             <a:pPr rtl="0"/>
-            <a:r>
-              <a:rPr lang="en-GB" dirty="0"/>
-              <a:t>Please Give me a JOB!!!</a:t>
-            </a:r>
+            <a:endParaRPr lang="en-GB" dirty="0"/>
           </a:p>
         </p:txBody>
       </p:sp>
@@ -12081,6 +12078,165 @@
           <a:chExt cx="0" cy="0"/>
         </a:xfrm>
       </p:grpSpPr>
+      <p:sp useBgFill="1">
+        <p:nvSpPr>
+          <p:cNvPr id="21" name="Rectangle 20">
+            <a:extLst>
+              <a:ext uri="{FF2B5EF4-FFF2-40B4-BE49-F238E27FC236}">
+                <a16:creationId xmlns:a16="http://schemas.microsoft.com/office/drawing/2014/main" id="{F3704D8A-9BFC-439A-A95B-B063277711FE}"/>
+              </a:ext>
+              <a:ext uri="{C183D7F6-B498-43B3-948B-1728B52AA6E4}">
+                <adec:decorative xmlns:adec="http://schemas.microsoft.com/office/drawing/2017/decorative" val="1"/>
+              </a:ext>
+            </a:extLst>
+          </p:cNvPr>
+          <p:cNvSpPr>
+            <a:spLocks noGrp="1" noRot="1" noChangeAspect="1" noMove="1" noResize="1" noEditPoints="1" noAdjustHandles="1" noChangeArrowheads="1" noChangeShapeType="1" noTextEdit="1"/>
+          </p:cNvSpPr>
+          <p:nvPr>
+            <p:extLst>
+              <p:ext uri="{386F3935-93C4-4BCD-93E2-E3B085C9AB24}">
+                <p16:designElem xmlns:p16="http://schemas.microsoft.com/office/powerpoint/2015/main" val="1"/>
+              </p:ext>
+            </p:extLst>
+          </p:nvPr>
+        </p:nvSpPr>
+        <p:spPr>
+          <a:xfrm>
+            <a:off x="0" y="0"/>
+            <a:ext cx="12188952" cy="6858001"/>
+          </a:xfrm>
+          <a:prstGeom prst="rect">
+            <a:avLst/>
+          </a:prstGeom>
+          <a:ln>
+            <a:noFill/>
+          </a:ln>
+        </p:spPr>
+        <p:style>
+          <a:lnRef idx="2">
+            <a:schemeClr val="accent1">
+              <a:shade val="50000"/>
+            </a:schemeClr>
+          </a:lnRef>
+          <a:fillRef idx="1">
+            <a:schemeClr val="accent1"/>
+          </a:fillRef>
+          <a:effectRef idx="0">
+            <a:schemeClr val="accent1"/>
+          </a:effectRef>
+          <a:fontRef idx="minor">
+            <a:schemeClr val="lt1"/>
+          </a:fontRef>
+        </p:style>
+        <p:txBody>
+          <a:bodyPr rot="0" spcFirstLastPara="0" vert="horz" wrap="square" lIns="91440" tIns="45720" rIns="91440" bIns="45720" numCol="1" spcCol="0" rtlCol="0" fromWordArt="0" anchor="ctr" anchorCtr="0" forceAA="0" compatLnSpc="1">
+            <a:prstTxWarp prst="textNoShape">
+              <a:avLst/>
+            </a:prstTxWarp>
+            <a:noAutofit/>
+          </a:bodyPr>
+          <a:lstStyle>
+            <a:defPPr>
+              <a:defRPr lang="en-US"/>
+            </a:defPPr>
+            <a:lvl1pPr marL="0" algn="l" defTabSz="914400" rtl="0" eaLnBrk="1" latinLnBrk="0" hangingPunct="1">
+              <a:defRPr sz="1800" kern="1200">
+                <a:solidFill>
+                  <a:schemeClr val="lt1"/>
+                </a:solidFill>
+                <a:latin typeface="+mn-lt"/>
+                <a:ea typeface="+mn-ea"/>
+                <a:cs typeface="+mn-cs"/>
+              </a:defRPr>
+            </a:lvl1pPr>
+            <a:lvl2pPr marL="457200" algn="l" defTabSz="914400" rtl="0" eaLnBrk="1" latinLnBrk="0" hangingPunct="1">
+              <a:defRPr sz="1800" kern="1200">
+                <a:solidFill>
+                  <a:schemeClr val="lt1"/>
+                </a:solidFill>
+                <a:latin typeface="+mn-lt"/>
+                <a:ea typeface="+mn-ea"/>
+                <a:cs typeface="+mn-cs"/>
+              </a:defRPr>
+            </a:lvl2pPr>
+            <a:lvl3pPr marL="914400" algn="l" defTabSz="914400" rtl="0" eaLnBrk="1" latinLnBrk="0" hangingPunct="1">
+              <a:defRPr sz="1800" kern="1200">
+                <a:solidFill>
+                  <a:schemeClr val="lt1"/>
+                </a:solidFill>
+                <a:latin typeface="+mn-lt"/>
+                <a:ea typeface="+mn-ea"/>
+                <a:cs typeface="+mn-cs"/>
+              </a:defRPr>
+            </a:lvl3pPr>
+            <a:lvl4pPr marL="1371600" algn="l" defTabSz="914400" rtl="0" eaLnBrk="1" latinLnBrk="0" hangingPunct="1">
+              <a:defRPr sz="1800" kern="1200">
+                <a:solidFill>
+                  <a:schemeClr val="lt1"/>
+                </a:solidFill>
+                <a:latin typeface="+mn-lt"/>
+                <a:ea typeface="+mn-ea"/>
+                <a:cs typeface="+mn-cs"/>
+              </a:defRPr>
+            </a:lvl4pPr>
+            <a:lvl5pPr marL="1828800" algn="l" defTabSz="914400" rtl="0" eaLnBrk="1" latinLnBrk="0" hangingPunct="1">
+              <a:defRPr sz="1800" kern="1200">
+                <a:solidFill>
+                  <a:schemeClr val="lt1"/>
+                </a:solidFill>
+                <a:latin typeface="+mn-lt"/>
+                <a:ea typeface="+mn-ea"/>
+                <a:cs typeface="+mn-cs"/>
+              </a:defRPr>
+            </a:lvl5pPr>
+            <a:lvl6pPr marL="2286000" algn="l" defTabSz="914400" rtl="0" eaLnBrk="1" latinLnBrk="0" hangingPunct="1">
+              <a:defRPr sz="1800" kern="1200">
+                <a:solidFill>
+                  <a:schemeClr val="lt1"/>
+                </a:solidFill>
+                <a:latin typeface="+mn-lt"/>
+                <a:ea typeface="+mn-ea"/>
+                <a:cs typeface="+mn-cs"/>
+              </a:defRPr>
+            </a:lvl6pPr>
+            <a:lvl7pPr marL="2743200" algn="l" defTabSz="914400" rtl="0" eaLnBrk="1" latinLnBrk="0" hangingPunct="1">
+              <a:defRPr sz="1800" kern="1200">
+                <a:solidFill>
+                  <a:schemeClr val="lt1"/>
+                </a:solidFill>
+                <a:latin typeface="+mn-lt"/>
+                <a:ea typeface="+mn-ea"/>
+                <a:cs typeface="+mn-cs"/>
+              </a:defRPr>
+            </a:lvl7pPr>
+            <a:lvl8pPr marL="3200400" algn="l" defTabSz="914400" rtl="0" eaLnBrk="1" latinLnBrk="0" hangingPunct="1">
+              <a:defRPr sz="1800" kern="1200">
+                <a:solidFill>
+                  <a:schemeClr val="lt1"/>
+                </a:solidFill>
+                <a:latin typeface="+mn-lt"/>
+                <a:ea typeface="+mn-ea"/>
+                <a:cs typeface="+mn-cs"/>
+              </a:defRPr>
+            </a:lvl8pPr>
+            <a:lvl9pPr marL="3657600" algn="l" defTabSz="914400" rtl="0" eaLnBrk="1" latinLnBrk="0" hangingPunct="1">
+              <a:defRPr sz="1800" kern="1200">
+                <a:solidFill>
+                  <a:schemeClr val="lt1"/>
+                </a:solidFill>
+                <a:latin typeface="+mn-lt"/>
+                <a:ea typeface="+mn-ea"/>
+                <a:cs typeface="+mn-cs"/>
+              </a:defRPr>
+            </a:lvl9pPr>
+          </a:lstStyle>
+          <a:p>
+            <a:pPr algn="ctr"/>
+            <a:endParaRPr lang="en-US"/>
+          </a:p>
+        </p:txBody>
+      </p:sp>
       <p:sp>
         <p:nvSpPr>
           <p:cNvPr id="2" name="Title 1">
@@ -12099,8 +12255,8 @@
         </p:nvSpPr>
         <p:spPr>
           <a:xfrm>
-            <a:off x="1627632" y="624109"/>
-            <a:ext cx="2487168" cy="4972019"/>
+            <a:off x="649224" y="645106"/>
+            <a:ext cx="6574536" cy="1259894"/>
           </a:xfrm>
         </p:spPr>
         <p:txBody>
@@ -12109,14 +12265,80 @@
           </a:bodyPr>
           <a:lstStyle/>
           <a:p>
+            <a:pPr>
+              <a:lnSpc>
+                <a:spcPct val="90000"/>
+              </a:lnSpc>
+            </a:pPr>
             <a:r>
-              <a:rPr lang="en-GB" sz="3200" b="1"/>
+              <a:rPr lang="en-GB" sz="2800" b="1"/>
               <a:t>Behold! The Terraform Script That Built It All</a:t>
             </a:r>
             <a:br>
-              <a:rPr lang="en-GB" sz="3200"/>
+              <a:rPr lang="en-GB" sz="2800"/>
             </a:br>
-            <a:endParaRPr lang="en-GB" sz="3200"/>
+            <a:endParaRPr lang="en-GB" sz="2800"/>
+          </a:p>
+        </p:txBody>
+      </p:sp>
+      <p:sp>
+        <p:nvSpPr>
+          <p:cNvPr id="22" name="Rectangle 21">
+            <a:extLst>
+              <a:ext uri="{FF2B5EF4-FFF2-40B4-BE49-F238E27FC236}">
+                <a16:creationId xmlns:a16="http://schemas.microsoft.com/office/drawing/2014/main" id="{A61FE79C-AE92-465F-B254-E0D3FFE12723}"/>
+              </a:ext>
+              <a:ext uri="{C183D7F6-B498-43B3-948B-1728B52AA6E4}">
+                <adec:decorative xmlns:adec="http://schemas.microsoft.com/office/drawing/2017/decorative" val="1"/>
+              </a:ext>
+            </a:extLst>
+          </p:cNvPr>
+          <p:cNvSpPr>
+            <a:spLocks noGrp="1" noRot="1" noChangeAspect="1" noMove="1" noResize="1" noEditPoints="1" noAdjustHandles="1" noChangeArrowheads="1" noChangeShapeType="1" noTextEdit="1"/>
+          </p:cNvSpPr>
+          <p:nvPr>
+            <p:extLst>
+              <p:ext uri="{386F3935-93C4-4BCD-93E2-E3B085C9AB24}">
+                <p16:designElem xmlns:p16="http://schemas.microsoft.com/office/powerpoint/2015/main" val="1"/>
+              </p:ext>
+            </p:extLst>
+          </p:nvPr>
+        </p:nvSpPr>
+        <p:spPr>
+          <a:xfrm>
+            <a:off x="0" y="0"/>
+            <a:ext cx="182880" cy="6858000"/>
+          </a:xfrm>
+          <a:prstGeom prst="rect">
+            <a:avLst/>
+          </a:prstGeom>
+          <a:solidFill>
+            <a:schemeClr val="accent1"/>
+          </a:solidFill>
+          <a:ln>
+            <a:noFill/>
+          </a:ln>
+          <a:effectLst/>
+        </p:spPr>
+        <p:style>
+          <a:lnRef idx="1">
+            <a:schemeClr val="accent1"/>
+          </a:lnRef>
+          <a:fillRef idx="3">
+            <a:schemeClr val="accent1"/>
+          </a:fillRef>
+          <a:effectRef idx="2">
+            <a:schemeClr val="accent1"/>
+          </a:effectRef>
+          <a:fontRef idx="minor">
+            <a:schemeClr val="lt1"/>
+          </a:fontRef>
+        </p:style>
+        <p:txBody>
+          <a:bodyPr/>
+          <a:lstStyle/>
+          <a:p>
+            <a:endParaRPr lang="en-GB"/>
           </a:p>
         </p:txBody>
       </p:sp>
@@ -12138,8 +12360,8 @@
         </p:nvSpPr>
         <p:spPr>
           <a:xfrm>
-            <a:off x="4700016" y="624110"/>
-            <a:ext cx="6804596" cy="3618706"/>
+            <a:off x="649224" y="2133600"/>
+            <a:ext cx="6574535" cy="3759253"/>
           </a:xfrm>
         </p:spPr>
         <p:txBody>
@@ -12214,10 +12436,10 @@
       </p:sp>
       <p:pic>
         <p:nvPicPr>
-          <p:cNvPr id="8" name="Picture 7" descr="A screenshot of a computer program">
+          <p:cNvPr id="10" name="Picture 9" descr="A screenshot of a computer program&#10;&#10;AI-generated content may be incorrect.">
             <a:extLst>
               <a:ext uri="{FF2B5EF4-FFF2-40B4-BE49-F238E27FC236}">
-                <a16:creationId xmlns:a16="http://schemas.microsoft.com/office/drawing/2014/main" id="{D0F585DB-C77B-F21F-7B98-E11BEC3576E3}"/>
+                <a16:creationId xmlns:a16="http://schemas.microsoft.com/office/drawing/2014/main" id="{812B33FE-225F-1821-1112-14B1DE9369A1}"/>
               </a:ext>
             </a:extLst>
           </p:cNvPr>
@@ -12228,20 +12450,184 @@
         </p:nvPicPr>
         <p:blipFill>
           <a:blip r:embed="rId2"/>
+          <a:srcRect l="1379" t="3240" b="7832"/>
           <a:stretch>
             <a:fillRect/>
           </a:stretch>
         </p:blipFill>
         <p:spPr>
           <a:xfrm>
-            <a:off x="4575747" y="3471129"/>
-            <a:ext cx="6796785" cy="1543374"/>
+            <a:off x="6699250" y="2254250"/>
+            <a:ext cx="3926553" cy="1752600"/>
           </a:xfrm>
           <a:prstGeom prst="rect">
             <a:avLst/>
           </a:prstGeom>
         </p:spPr>
       </p:pic>
+      <p:sp>
+        <p:nvSpPr>
+          <p:cNvPr id="23" name="Freeform 43">
+            <a:extLst>
+              <a:ext uri="{FF2B5EF4-FFF2-40B4-BE49-F238E27FC236}">
+                <a16:creationId xmlns:a16="http://schemas.microsoft.com/office/drawing/2014/main" id="{8593629A-2C00-4824-90EF-8547026D6A23}"/>
+              </a:ext>
+              <a:ext uri="{C183D7F6-B498-43B3-948B-1728B52AA6E4}">
+                <adec:decorative xmlns:adec="http://schemas.microsoft.com/office/drawing/2017/decorative" val="1"/>
+              </a:ext>
+            </a:extLst>
+          </p:cNvPr>
+          <p:cNvSpPr>
+            <a:spLocks noGrp="1" noRot="1" noChangeAspect="1" noMove="1" noResize="1" noEditPoints="1" noAdjustHandles="1" noChangeArrowheads="1" noChangeShapeType="1" noTextEdit="1"/>
+          </p:cNvSpPr>
+          <p:nvPr>
+            <p:extLst>
+              <p:ext uri="{386F3935-93C4-4BCD-93E2-E3B085C9AB24}">
+                <p16:designElem xmlns:p16="http://schemas.microsoft.com/office/powerpoint/2015/main" val="1"/>
+              </p:ext>
+            </p:extLst>
+          </p:nvPr>
+        </p:nvSpPr>
+        <p:spPr bwMode="auto">
+          <a:xfrm flipV="1">
+            <a:off x="182880" y="6061223"/>
+            <a:ext cx="855156" cy="506277"/>
+          </a:xfrm>
+          <a:custGeom>
+            <a:avLst/>
+            <a:gdLst>
+              <a:gd name="connsiteX0" fmla="*/ 0 w 855156"/>
+              <a:gd name="connsiteY0" fmla="*/ 506277 h 506277"/>
+              <a:gd name="connsiteX1" fmla="*/ 509169 w 855156"/>
+              <a:gd name="connsiteY1" fmla="*/ 505572 h 506277"/>
+              <a:gd name="connsiteX2" fmla="*/ 599864 w 855156"/>
+              <a:gd name="connsiteY2" fmla="*/ 505572 h 506277"/>
+              <a:gd name="connsiteX3" fmla="*/ 614121 w 855156"/>
+              <a:gd name="connsiteY3" fmla="*/ 500804 h 506277"/>
+              <a:gd name="connsiteX4" fmla="*/ 619102 w 855156"/>
+              <a:gd name="connsiteY4" fmla="*/ 496035 h 506277"/>
+              <a:gd name="connsiteX5" fmla="*/ 848071 w 855156"/>
+              <a:gd name="connsiteY5" fmla="*/ 267092 h 506277"/>
+              <a:gd name="connsiteX6" fmla="*/ 848071 w 855156"/>
+              <a:gd name="connsiteY6" fmla="*/ 238480 h 506277"/>
+              <a:gd name="connsiteX7" fmla="*/ 619102 w 855156"/>
+              <a:gd name="connsiteY7" fmla="*/ 9537 h 506277"/>
+              <a:gd name="connsiteX8" fmla="*/ 614121 w 855156"/>
+              <a:gd name="connsiteY8" fmla="*/ 4769 h 506277"/>
+              <a:gd name="connsiteX9" fmla="*/ 599864 w 855156"/>
+              <a:gd name="connsiteY9" fmla="*/ 0 h 506277"/>
+              <a:gd name="connsiteX10" fmla="*/ 509169 w 855156"/>
+              <a:gd name="connsiteY10" fmla="*/ 0 h 506277"/>
+              <a:gd name="connsiteX11" fmla="*/ 0 w 855156"/>
+              <a:gd name="connsiteY11" fmla="*/ 1447 h 506277"/>
+            </a:gdLst>
+            <a:ahLst/>
+            <a:cxnLst>
+              <a:cxn ang="0">
+                <a:pos x="connsiteX0" y="connsiteY0"/>
+              </a:cxn>
+              <a:cxn ang="0">
+                <a:pos x="connsiteX1" y="connsiteY1"/>
+              </a:cxn>
+              <a:cxn ang="0">
+                <a:pos x="connsiteX2" y="connsiteY2"/>
+              </a:cxn>
+              <a:cxn ang="0">
+                <a:pos x="connsiteX3" y="connsiteY3"/>
+              </a:cxn>
+              <a:cxn ang="0">
+                <a:pos x="connsiteX4" y="connsiteY4"/>
+              </a:cxn>
+              <a:cxn ang="0">
+                <a:pos x="connsiteX5" y="connsiteY5"/>
+              </a:cxn>
+              <a:cxn ang="0">
+                <a:pos x="connsiteX6" y="connsiteY6"/>
+              </a:cxn>
+              <a:cxn ang="0">
+                <a:pos x="connsiteX7" y="connsiteY7"/>
+              </a:cxn>
+              <a:cxn ang="0">
+                <a:pos x="connsiteX8" y="connsiteY8"/>
+              </a:cxn>
+              <a:cxn ang="0">
+                <a:pos x="connsiteX9" y="connsiteY9"/>
+              </a:cxn>
+              <a:cxn ang="0">
+                <a:pos x="connsiteX10" y="connsiteY10"/>
+              </a:cxn>
+              <a:cxn ang="0">
+                <a:pos x="connsiteX11" y="connsiteY11"/>
+              </a:cxn>
+            </a:cxnLst>
+            <a:rect l="l" t="t" r="r" b="b"/>
+            <a:pathLst>
+              <a:path w="855156" h="506277">
+                <a:moveTo>
+                  <a:pt x="0" y="506277"/>
+                </a:moveTo>
+                <a:lnTo>
+                  <a:pt x="509169" y="505572"/>
+                </a:lnTo>
+                <a:lnTo>
+                  <a:pt x="599864" y="505572"/>
+                </a:lnTo>
+                <a:cubicBezTo>
+                  <a:pt x="604673" y="505572"/>
+                  <a:pt x="609483" y="500804"/>
+                  <a:pt x="614121" y="500804"/>
+                </a:cubicBezTo>
+                <a:cubicBezTo>
+                  <a:pt x="614121" y="496035"/>
+                  <a:pt x="619102" y="496035"/>
+                  <a:pt x="619102" y="496035"/>
+                </a:cubicBezTo>
+                <a:lnTo>
+                  <a:pt x="848071" y="267092"/>
+                </a:lnTo>
+                <a:cubicBezTo>
+                  <a:pt x="857518" y="257555"/>
+                  <a:pt x="857518" y="248018"/>
+                  <a:pt x="848071" y="238480"/>
+                </a:cubicBezTo>
+                <a:lnTo>
+                  <a:pt x="619102" y="9537"/>
+                </a:lnTo>
+                <a:cubicBezTo>
+                  <a:pt x="617556" y="7914"/>
+                  <a:pt x="615667" y="6392"/>
+                  <a:pt x="614121" y="4769"/>
+                </a:cubicBezTo>
+                <a:cubicBezTo>
+                  <a:pt x="609483" y="0"/>
+                  <a:pt x="604673" y="0"/>
+                  <a:pt x="599864" y="0"/>
+                </a:cubicBezTo>
+                <a:lnTo>
+                  <a:pt x="509169" y="0"/>
+                </a:lnTo>
+                <a:lnTo>
+                  <a:pt x="0" y="1447"/>
+                </a:lnTo>
+                <a:close/>
+              </a:path>
+            </a:pathLst>
+          </a:custGeom>
+          <a:solidFill>
+            <a:schemeClr val="accent1"/>
+          </a:solidFill>
+          <a:ln>
+            <a:noFill/>
+          </a:ln>
+        </p:spPr>
+        <p:txBody>
+          <a:bodyPr/>
+          <a:lstStyle/>
+          <a:p>
+            <a:endParaRPr lang="en-GB"/>
+          </a:p>
+        </p:txBody>
+      </p:sp>
     </p:spTree>
     <p:extLst>
       <p:ext uri="{BB962C8B-B14F-4D97-AF65-F5344CB8AC3E}">
@@ -22464,50 +22850,6 @@
       </p:sp>
       <p:sp>
         <p:nvSpPr>
-          <p:cNvPr id="2" name="Title 1">
-            <a:extLst>
-              <a:ext uri="{FF2B5EF4-FFF2-40B4-BE49-F238E27FC236}">
-                <a16:creationId xmlns:a16="http://schemas.microsoft.com/office/drawing/2014/main" id="{5F3F6C66-D6D7-4A72-9928-967AEA400766}"/>
-              </a:ext>
-            </a:extLst>
-          </p:cNvPr>
-          <p:cNvSpPr>
-            <a:spLocks noGrp="1"/>
-          </p:cNvSpPr>
-          <p:nvPr>
-            <p:ph type="title"/>
-          </p:nvPr>
-        </p:nvSpPr>
-        <p:spPr>
-          <a:xfrm>
-            <a:off x="649224" y="645106"/>
-            <a:ext cx="3650279" cy="1259894"/>
-          </a:xfrm>
-        </p:spPr>
-        <p:txBody>
-          <a:bodyPr vert="horz" lIns="91440" tIns="45720" rIns="91440" bIns="45720" rtlCol="0" anchor="t">
-            <a:normAutofit/>
-          </a:bodyPr>
-          <a:lstStyle/>
-          <a:p>
-            <a:pPr>
-              <a:lnSpc>
-                <a:spcPct val="90000"/>
-              </a:lnSpc>
-            </a:pPr>
-            <a:r>
-              <a:rPr lang="en-US" sz="2800"/>
-              <a:t>What We're Building Today</a:t>
-            </a:r>
-            <a:br>
-              <a:rPr lang="en-US" sz="2800"/>
-            </a:br>
-            <a:endParaRPr lang="en-US" sz="2800"/>
-          </a:p>
-        </p:txBody>
-      </p:sp>
-      <p:sp>
-        <p:nvSpPr>
           <p:cNvPr id="17" name="Rectangle 16">
             <a:extLst>
               <a:ext uri="{FF2B5EF4-FFF2-40B4-BE49-F238E27FC236}">
@@ -22732,13 +23074,7 @@
       </p:sp>
       <p:graphicFrame>
         <p:nvGraphicFramePr>
-          <p:cNvPr id="6" name="Content Placeholder 5">
-            <a:extLst>
-              <a:ext uri="{FF2B5EF4-FFF2-40B4-BE49-F238E27FC236}">
-                <a16:creationId xmlns:a16="http://schemas.microsoft.com/office/drawing/2014/main" id="{DC078FCB-2498-8FBF-3BD7-FA1E2F707E3B}"/>
-              </a:ext>
-            </a:extLst>
-          </p:cNvPr>
+          <p:cNvPr id="16" name="Content Placeholder 15"/>
           <p:cNvGraphicFramePr>
             <a:graphicFrameLocks noGrp="1"/>
           </p:cNvGraphicFramePr>
@@ -22746,73 +23082,59 @@
             <p:ph idx="1"/>
             <p:extLst>
               <p:ext uri="{D42A27DB-BD31-4B8C-83A1-F6EECF244321}">
-                <p14:modId xmlns:p14="http://schemas.microsoft.com/office/powerpoint/2010/main" val="2008757796"/>
+                <p14:modId xmlns:p14="http://schemas.microsoft.com/office/powerpoint/2010/main" val="1048329932"/>
               </p:ext>
             </p:extLst>
           </p:nvPr>
         </p:nvGraphicFramePr>
         <p:xfrm>
-          <a:off x="4888266" y="640080"/>
-          <a:ext cx="6416132" cy="5460306"/>
+          <a:off x="406400" y="182880"/>
+          <a:ext cx="10353040" cy="5512507"/>
         </p:xfrm>
         <a:graphic>
           <a:graphicData uri="http://schemas.openxmlformats.org/drawingml/2006/table">
             <a:tbl>
-              <a:tblPr firstRow="1" bandRow="1"/>
+              <a:tblPr firstRow="1" bandRow="1">
+                <a:tableStyleId>{5C22544A-7EE6-4342-B048-85BDC9FD1C3A}</a:tableStyleId>
+              </a:tblPr>
               <a:tblGrid>
-                <a:gridCol w="3273034">
+                <a:gridCol w="2875843">
                   <a:extLst>
                     <a:ext uri="{9D8B030D-6E8A-4147-A177-3AD203B41FA5}">
-                      <a16:colId xmlns:a16="http://schemas.microsoft.com/office/drawing/2014/main" val="1167697396"/>
+                      <a16:colId xmlns:a16="http://schemas.microsoft.com/office/drawing/2014/main" val="20000"/>
                     </a:ext>
                   </a:extLst>
                 </a:gridCol>
-                <a:gridCol w="3143098">
+                <a:gridCol w="7477197">
                   <a:extLst>
                     <a:ext uri="{9D8B030D-6E8A-4147-A177-3AD203B41FA5}">
-                      <a16:colId xmlns:a16="http://schemas.microsoft.com/office/drawing/2014/main" val="3734339484"/>
+                      <a16:colId xmlns:a16="http://schemas.microsoft.com/office/drawing/2014/main" val="20001"/>
                     </a:ext>
                   </a:extLst>
                 </a:gridCol>
               </a:tblGrid>
-              <a:tr h="393250">
+              <a:tr h="155899">
                 <a:tc>
                   <a:txBody>
                     <a:bodyPr/>
                     <a:lstStyle/>
                     <a:p>
-                      <a:pPr algn="l"/>
+                      <a:pPr>
+                        <a:defRPr sz="1100" b="1">
+                          <a:solidFill>
+                            <a:srgbClr val="FFFFFF"/>
+                          </a:solidFill>
+                        </a:defRPr>
+                      </a:pPr>
                       <a:r>
-                        <a:rPr lang="en-GB" sz="1600" b="1">
-                          <a:solidFill>
-                            <a:srgbClr val="F5F5F5"/>
-                          </a:solidFill>
-                          <a:effectLst/>
-                        </a:rPr>
-                        <a:t>Layer</a:t>
+                        <a:t>Component</a:t>
                       </a:r>
                     </a:p>
                   </a:txBody>
-                  <a:tcPr marL="77494" marR="53816" marT="53816" marB="53816" anchor="ctr">
-                    <a:lnL>
-                      <a:noFill/>
-                    </a:lnL>
-                    <a:lnR>
-                      <a:noFill/>
-                    </a:lnR>
-                    <a:lnT>
-                      <a:noFill/>
-                    </a:lnT>
-                    <a:lnB w="7938" cap="flat" cmpd="sng" algn="ctr">
-                      <a:solidFill>
-                        <a:srgbClr val="8B8B8B"/>
-                      </a:solidFill>
-                      <a:prstDash val="solid"/>
-                      <a:round/>
-                      <a:headEnd type="none" w="med" len="med"/>
-                      <a:tailEnd type="none" w="med" len="med"/>
-                    </a:lnB>
-                    <a:noFill/>
+                  <a:tcPr>
+                    <a:solidFill>
+                      <a:srgbClr val="0066CC"/>
+                    </a:solidFill>
                   </a:tcPr>
                 </a:tc>
                 <a:tc>
@@ -22820,515 +23142,464 @@
                     <a:bodyPr/>
                     <a:lstStyle/>
                     <a:p>
-                      <a:pPr algn="l"/>
+                      <a:pPr>
+                        <a:defRPr sz="1100" b="1">
+                          <a:solidFill>
+                            <a:srgbClr val="FFFFFF"/>
+                          </a:solidFill>
+                        </a:defRPr>
+                      </a:pPr>
                       <a:r>
-                        <a:rPr lang="en-GB" sz="1600" b="1">
-                          <a:solidFill>
-                            <a:srgbClr val="F5F5F5"/>
-                          </a:solidFill>
-                          <a:effectLst/>
-                        </a:rPr>
-                        <a:t>Components &amp; Features</a:t>
+                        <a:t>Details</a:t>
                       </a:r>
                     </a:p>
                   </a:txBody>
-                  <a:tcPr marL="53816" marR="53816" marT="53816" marB="53816" anchor="ctr">
-                    <a:lnL>
-                      <a:noFill/>
-                    </a:lnL>
-                    <a:lnR>
-                      <a:noFill/>
-                    </a:lnR>
-                    <a:lnT>
-                      <a:noFill/>
-                    </a:lnT>
-                    <a:lnB w="7938" cap="flat" cmpd="sng" algn="ctr">
-                      <a:solidFill>
-                        <a:srgbClr val="8B8B8B"/>
-                      </a:solidFill>
-                      <a:prstDash val="solid"/>
-                      <a:round/>
-                      <a:headEnd type="none" w="med" len="med"/>
-                      <a:tailEnd type="none" w="med" len="med"/>
-                    </a:lnB>
-                    <a:noFill/>
+                  <a:tcPr>
+                    <a:solidFill>
+                      <a:srgbClr val="0066CC"/>
+                    </a:solidFill>
                   </a:tcPr>
                 </a:tc>
                 <a:extLst>
                   <a:ext uri="{0D108BD9-81ED-4DB2-BD59-A6C34878D82A}">
-                    <a16:rowId xmlns:a16="http://schemas.microsoft.com/office/drawing/2014/main" val="4037867693"/>
+                    <a16:rowId xmlns:a16="http://schemas.microsoft.com/office/drawing/2014/main" val="10000"/>
                   </a:ext>
                 </a:extLst>
               </a:tr>
-              <a:tr h="1116569">
+              <a:tr h="816175">
                 <a:tc>
                   <a:txBody>
                     <a:bodyPr/>
                     <a:lstStyle/>
                     <a:p>
+                      <a:pPr>
+                        <a:defRPr sz="1100">
+                          <a:solidFill>
+                            <a:srgbClr val="000000"/>
+                          </a:solidFill>
+                        </a:defRPr>
+                      </a:pPr>
                       <a:r>
-                        <a:rPr lang="en-GB" sz="1600" b="1">
-                          <a:effectLst/>
-                        </a:rPr>
-                        <a:t>🚀 Infrastructure Foundation</a:t>
+                        <a:rPr sz="1000" b="1" dirty="0"/>
+                        <a:t>EKS Control Plane (Managed by AWS)</a:t>
                       </a:r>
-                      <a:endParaRPr lang="en-GB" sz="1600">
-                        <a:effectLst/>
-                      </a:endParaRPr>
                     </a:p>
                   </a:txBody>
-                  <a:tcPr marL="77494" marR="53816" marT="53816" marB="53816" anchor="ctr">
-                    <a:lnL>
-                      <a:noFill/>
-                    </a:lnL>
-                    <a:lnR>
-                      <a:noFill/>
-                    </a:lnR>
-                    <a:lnT w="7938" cap="flat" cmpd="sng" algn="ctr">
-                      <a:solidFill>
-                        <a:srgbClr val="8B8B8B"/>
-                      </a:solidFill>
-                      <a:prstDash val="solid"/>
-                      <a:round/>
-                      <a:headEnd type="none" w="med" len="med"/>
-                      <a:tailEnd type="none" w="med" len="med"/>
-                    </a:lnT>
-                    <a:lnB w="7938" cap="flat" cmpd="sng" algn="ctr">
-                      <a:solidFill>
-                        <a:srgbClr val="525252"/>
-                      </a:solidFill>
-                      <a:prstDash val="solid"/>
-                      <a:round/>
-                      <a:headEnd type="none" w="med" len="med"/>
-                      <a:tailEnd type="none" w="med" len="med"/>
-                    </a:lnB>
-                    <a:noFill/>
-                  </a:tcPr>
+                  <a:tcPr/>
                 </a:tc>
                 <a:tc>
                   <a:txBody>
                     <a:bodyPr/>
                     <a:lstStyle/>
                     <a:p>
+                      <a:pPr>
+                        <a:defRPr sz="1100">
+                          <a:solidFill>
+                            <a:srgbClr val="000000"/>
+                          </a:solidFill>
+                        </a:defRPr>
+                      </a:pPr>
                       <a:r>
-                        <a:rPr lang="en-GB" sz="1600">
-                          <a:effectLst/>
-                        </a:rPr>
-                        <a:t>AWS EKS Cluster, VPC with Public/Private Subnets, Auto-Scaling Node Groups, Load Balancers</a:t>
+                        <a:rPr sz="1000" dirty="0"/>
+                        <a:t>API Server – Handles Kubernetes API requests</a:t>
+                      </a:r>
+                    </a:p>
+                    <a:p>
+                      <a:r>
+                        <a:rPr sz="1000" dirty="0"/>
+                        <a:t>Scheduler – Assigns pods to nodes</a:t>
+                      </a:r>
+                    </a:p>
+                    <a:p>
+                      <a:r>
+                        <a:rPr sz="1000" dirty="0"/>
+                        <a:t>Controller Manager – Manages cluster state</a:t>
+                      </a:r>
+                    </a:p>
+                    <a:p>
+                      <a:r>
+                        <a:rPr sz="1000" dirty="0" err="1"/>
+                        <a:t>etcd</a:t>
+                      </a:r>
+                      <a:r>
+                        <a:rPr sz="1000" dirty="0"/>
+                        <a:t> – Distributed key-value store</a:t>
                       </a:r>
                     </a:p>
                   </a:txBody>
-                  <a:tcPr marL="53816" marR="53816" marT="53816" marB="53816" anchor="ctr">
-                    <a:lnL>
-                      <a:noFill/>
-                    </a:lnL>
-                    <a:lnR>
-                      <a:noFill/>
-                    </a:lnR>
-                    <a:lnT w="7938" cap="flat" cmpd="sng" algn="ctr">
-                      <a:solidFill>
-                        <a:srgbClr val="8B8B8B"/>
-                      </a:solidFill>
-                      <a:prstDash val="solid"/>
-                      <a:round/>
-                      <a:headEnd type="none" w="med" len="med"/>
-                      <a:tailEnd type="none" w="med" len="med"/>
-                    </a:lnT>
-                    <a:lnB w="7938" cap="flat" cmpd="sng" algn="ctr">
-                      <a:solidFill>
-                        <a:srgbClr val="525252"/>
-                      </a:solidFill>
-                      <a:prstDash val="solid"/>
-                      <a:round/>
-                      <a:headEnd type="none" w="med" len="med"/>
-                      <a:tailEnd type="none" w="med" len="med"/>
-                    </a:lnB>
-                    <a:noFill/>
-                  </a:tcPr>
+                  <a:tcPr/>
                 </a:tc>
                 <a:extLst>
                   <a:ext uri="{0D108BD9-81ED-4DB2-BD59-A6C34878D82A}">
-                    <a16:rowId xmlns:a16="http://schemas.microsoft.com/office/drawing/2014/main" val="837569676"/>
+                    <a16:rowId xmlns:a16="http://schemas.microsoft.com/office/drawing/2014/main" val="10001"/>
                   </a:ext>
                 </a:extLst>
               </a:tr>
-              <a:tr h="1116569">
+              <a:tr h="651106">
                 <a:tc>
                   <a:txBody>
                     <a:bodyPr/>
                     <a:lstStyle/>
                     <a:p>
+                      <a:pPr>
+                        <a:defRPr sz="1100">
+                          <a:solidFill>
+                            <a:srgbClr val="000000"/>
+                          </a:solidFill>
+                        </a:defRPr>
+                      </a:pPr>
                       <a:r>
-                        <a:rPr lang="en-GB" sz="1600" b="1">
-                          <a:effectLst/>
-                        </a:rPr>
-                        <a:t>🔍 Data Layer (Elasticsearch)</a:t>
+                        <a:rPr sz="1000"/>
+                        <a:t>Worker Node 1</a:t>
                       </a:r>
-                      <a:endParaRPr lang="en-GB" sz="1600">
-                        <a:effectLst/>
-                      </a:endParaRPr>
                     </a:p>
                   </a:txBody>
-                  <a:tcPr marL="77494" marR="53816" marT="53816" marB="53816" anchor="ctr">
-                    <a:lnL>
-                      <a:noFill/>
-                    </a:lnL>
-                    <a:lnR>
-                      <a:noFill/>
-                    </a:lnR>
-                    <a:lnT w="7938" cap="flat" cmpd="sng" algn="ctr">
-                      <a:solidFill>
-                        <a:srgbClr val="525252"/>
-                      </a:solidFill>
-                      <a:prstDash val="solid"/>
-                      <a:round/>
-                      <a:headEnd type="none" w="med" len="med"/>
-                      <a:tailEnd type="none" w="med" len="med"/>
-                    </a:lnT>
-                    <a:lnB w="7938" cap="flat" cmpd="sng" algn="ctr">
-                      <a:solidFill>
-                        <a:srgbClr val="525252"/>
-                      </a:solidFill>
-                      <a:prstDash val="solid"/>
-                      <a:round/>
-                      <a:headEnd type="none" w="med" len="med"/>
-                      <a:tailEnd type="none" w="med" len="med"/>
-                    </a:lnB>
-                    <a:noFill/>
-                  </a:tcPr>
+                  <a:tcPr/>
                 </a:tc>
                 <a:tc>
                   <a:txBody>
                     <a:bodyPr/>
                     <a:lstStyle/>
                     <a:p>
+                      <a:pPr>
+                        <a:defRPr sz="1100">
+                          <a:solidFill>
+                            <a:srgbClr val="000000"/>
+                          </a:solidFill>
+                        </a:defRPr>
+                      </a:pPr>
                       <a:r>
-                        <a:rPr lang="en-GB" sz="1600" dirty="0">
-                          <a:effectLst/>
-                        </a:rPr>
-                        <a:t>3-Node Cluster (HA), EBS Persistent Storage (100GB each), </a:t>
+                        <a:rPr sz="1000" dirty="0"/>
+                        <a:t>Instance Type: t3.medium (2 vCPU, 4 GiB RAM)</a:t>
                       </a:r>
+                    </a:p>
+                    <a:p>
                       <a:r>
-                        <a:rPr lang="en-GB" sz="1600" dirty="0" err="1">
-                          <a:effectLst/>
-                        </a:rPr>
-                        <a:t>StatefulSet</a:t>
+                        <a:rPr sz="1000" dirty="0"/>
+                        <a:t>Purpose: Elasticsearch primary node</a:t>
                       </a:r>
+                    </a:p>
+                    <a:p>
                       <a:r>
-                        <a:rPr lang="en-GB" sz="1600" dirty="0">
-                          <a:effectLst/>
-                        </a:rPr>
-                        <a:t>, Auto-Scaling (CPU/Memory)</a:t>
+                        <a:rPr sz="1000" dirty="0"/>
+                        <a:t>Storage: 50 GiB EBS gp2 volume</a:t>
+                      </a:r>
+                    </a:p>
+                    <a:p>
+                      <a:r>
+                        <a:rPr sz="1000" dirty="0"/>
+                        <a:t>Ports: 9200 (HTTP), 9300 (TCP)</a:t>
                       </a:r>
                     </a:p>
                   </a:txBody>
-                  <a:tcPr marL="53816" marR="53816" marT="53816" marB="53816" anchor="ctr">
-                    <a:lnL>
-                      <a:noFill/>
-                    </a:lnL>
-                    <a:lnR>
-                      <a:noFill/>
-                    </a:lnR>
-                    <a:lnT w="7938" cap="flat" cmpd="sng" algn="ctr">
-                      <a:solidFill>
-                        <a:srgbClr val="525252"/>
-                      </a:solidFill>
-                      <a:prstDash val="solid"/>
-                      <a:round/>
-                      <a:headEnd type="none" w="med" len="med"/>
-                      <a:tailEnd type="none" w="med" len="med"/>
-                    </a:lnT>
-                    <a:lnB w="7938" cap="flat" cmpd="sng" algn="ctr">
-                      <a:solidFill>
-                        <a:srgbClr val="525252"/>
-                      </a:solidFill>
-                      <a:prstDash val="solid"/>
-                      <a:round/>
-                      <a:headEnd type="none" w="med" len="med"/>
-                      <a:tailEnd type="none" w="med" len="med"/>
-                    </a:lnB>
-                    <a:noFill/>
-                  </a:tcPr>
+                  <a:tcPr/>
                 </a:tc>
                 <a:extLst>
                   <a:ext uri="{0D108BD9-81ED-4DB2-BD59-A6C34878D82A}">
-                    <a16:rowId xmlns:a16="http://schemas.microsoft.com/office/drawing/2014/main" val="2665077117"/>
+                    <a16:rowId xmlns:a16="http://schemas.microsoft.com/office/drawing/2014/main" val="10002"/>
                   </a:ext>
                 </a:extLst>
               </a:tr>
-              <a:tr h="875463">
+              <a:tr h="981244">
                 <a:tc>
                   <a:txBody>
                     <a:bodyPr/>
                     <a:lstStyle/>
                     <a:p>
+                      <a:pPr>
+                        <a:defRPr sz="1100">
+                          <a:solidFill>
+                            <a:srgbClr val="000000"/>
+                          </a:solidFill>
+                        </a:defRPr>
+                      </a:pPr>
                       <a:r>
-                        <a:rPr lang="en-GB" sz="1600" b="1" dirty="0">
-                          <a:effectLst/>
-                        </a:rPr>
-                        <a:t>📊 Visualization Layer (Kibana)</a:t>
+                        <a:rPr sz="1000" dirty="0"/>
+                        <a:t>Worker Node 2</a:t>
                       </a:r>
-                      <a:endParaRPr lang="en-GB" sz="1600" dirty="0">
-                        <a:effectLst/>
-                      </a:endParaRPr>
                     </a:p>
                   </a:txBody>
-                  <a:tcPr marL="77494" marR="53816" marT="53816" marB="53816" anchor="ctr">
-                    <a:lnL>
-                      <a:noFill/>
-                    </a:lnL>
-                    <a:lnR>
-                      <a:noFill/>
-                    </a:lnR>
-                    <a:lnT w="7938" cap="flat" cmpd="sng" algn="ctr">
-                      <a:solidFill>
-                        <a:srgbClr val="525252"/>
-                      </a:solidFill>
-                      <a:prstDash val="solid"/>
-                      <a:round/>
-                      <a:headEnd type="none" w="med" len="med"/>
-                      <a:tailEnd type="none" w="med" len="med"/>
-                    </a:lnT>
-                    <a:lnB w="7938" cap="flat" cmpd="sng" algn="ctr">
-                      <a:solidFill>
-                        <a:srgbClr val="525252"/>
-                      </a:solidFill>
-                      <a:prstDash val="solid"/>
-                      <a:round/>
-                      <a:headEnd type="none" w="med" len="med"/>
-                      <a:tailEnd type="none" w="med" len="med"/>
-                    </a:lnB>
-                    <a:noFill/>
-                  </a:tcPr>
+                  <a:tcPr/>
                 </a:tc>
                 <a:tc>
                   <a:txBody>
                     <a:bodyPr/>
                     <a:lstStyle/>
                     <a:p>
+                      <a:pPr>
+                        <a:defRPr sz="1100">
+                          <a:solidFill>
+                            <a:srgbClr val="000000"/>
+                          </a:solidFill>
+                        </a:defRPr>
+                      </a:pPr>
                       <a:r>
-                        <a:rPr lang="en-GB" sz="1600">
-                          <a:effectLst/>
-                        </a:rPr>
-                        <a:t>2-Replica Deployment, Web Dashboard, External LB Access, Horizontal Pod Auto-Scaling</a:t>
+                        <a:rPr sz="1000"/>
+                        <a:t>Instance Type: t2.small (1 vCPU, 2 GiB RAM)</a:t>
+                      </a:r>
+                    </a:p>
+                    <a:p>
+                      <a:r>
+                        <a:rPr sz="1000"/>
+                        <a:t>Purpose: Kibana + Monitoring stack</a:t>
+                      </a:r>
+                    </a:p>
+                    <a:p>
+                      <a:r>
+                        <a:rPr sz="1000"/>
+                        <a:t>Components: Kibana, Prometheus, Grafana</a:t>
+                      </a:r>
+                    </a:p>
+                    <a:p>
+                      <a:r>
+                        <a:rPr sz="1000"/>
+                        <a:t>Ports: 5601 (Kibana), 3000 (Grafana), 9090 (Prometheus)</a:t>
                       </a:r>
                     </a:p>
                   </a:txBody>
-                  <a:tcPr marL="53816" marR="53816" marT="53816" marB="53816" anchor="ctr">
-                    <a:lnL>
-                      <a:noFill/>
-                    </a:lnL>
-                    <a:lnR>
-                      <a:noFill/>
-                    </a:lnR>
-                    <a:lnT w="7938" cap="flat" cmpd="sng" algn="ctr">
-                      <a:solidFill>
-                        <a:srgbClr val="525252"/>
-                      </a:solidFill>
-                      <a:prstDash val="solid"/>
-                      <a:round/>
-                      <a:headEnd type="none" w="med" len="med"/>
-                      <a:tailEnd type="none" w="med" len="med"/>
-                    </a:lnT>
-                    <a:lnB w="7938" cap="flat" cmpd="sng" algn="ctr">
-                      <a:solidFill>
-                        <a:srgbClr val="525252"/>
-                      </a:solidFill>
-                      <a:prstDash val="solid"/>
-                      <a:round/>
-                      <a:headEnd type="none" w="med" len="med"/>
-                      <a:tailEnd type="none" w="med" len="med"/>
-                    </a:lnB>
-                    <a:noFill/>
-                  </a:tcPr>
+                  <a:tcPr/>
                 </a:tc>
                 <a:extLst>
                   <a:ext uri="{0D108BD9-81ED-4DB2-BD59-A6C34878D82A}">
-                    <a16:rowId xmlns:a16="http://schemas.microsoft.com/office/drawing/2014/main" val="3471740599"/>
+                    <a16:rowId xmlns:a16="http://schemas.microsoft.com/office/drawing/2014/main" val="10003"/>
                   </a:ext>
                 </a:extLst>
               </a:tr>
-              <a:tr h="875463">
+              <a:tr h="1146313">
                 <a:tc>
                   <a:txBody>
                     <a:bodyPr/>
                     <a:lstStyle/>
                     <a:p>
+                      <a:pPr>
+                        <a:defRPr sz="1100">
+                          <a:solidFill>
+                            <a:srgbClr val="000000"/>
+                          </a:solidFill>
+                        </a:defRPr>
+                      </a:pPr>
                       <a:r>
-                        <a:rPr lang="en-GB" sz="1600" b="1">
-                          <a:effectLst/>
-                        </a:rPr>
-                        <a:t>📈 Monitoring &amp; Observability</a:t>
+                        <a:rPr sz="1000"/>
+                        <a:t>Networking</a:t>
                       </a:r>
-                      <a:endParaRPr lang="en-GB" sz="1600">
-                        <a:effectLst/>
-                      </a:endParaRPr>
                     </a:p>
                   </a:txBody>
-                  <a:tcPr marL="77494" marR="53816" marT="53816" marB="53816" anchor="ctr">
-                    <a:lnL>
-                      <a:noFill/>
-                    </a:lnL>
-                    <a:lnR>
-                      <a:noFill/>
-                    </a:lnR>
-                    <a:lnT w="7938" cap="flat" cmpd="sng" algn="ctr">
-                      <a:solidFill>
-                        <a:srgbClr val="525252"/>
-                      </a:solidFill>
-                      <a:prstDash val="solid"/>
-                      <a:round/>
-                      <a:headEnd type="none" w="med" len="med"/>
-                      <a:tailEnd type="none" w="med" len="med"/>
-                    </a:lnT>
-                    <a:lnB w="7938" cap="flat" cmpd="sng" algn="ctr">
-                      <a:solidFill>
-                        <a:srgbClr val="525252"/>
-                      </a:solidFill>
-                      <a:prstDash val="solid"/>
-                      <a:round/>
-                      <a:headEnd type="none" w="med" len="med"/>
-                      <a:tailEnd type="none" w="med" len="med"/>
-                    </a:lnB>
-                    <a:noFill/>
-                  </a:tcPr>
+                  <a:tcPr/>
                 </a:tc>
                 <a:tc>
                   <a:txBody>
                     <a:bodyPr/>
                     <a:lstStyle/>
                     <a:p>
+                      <a:pPr>
+                        <a:defRPr sz="1100">
+                          <a:solidFill>
+                            <a:srgbClr val="000000"/>
+                          </a:solidFill>
+                        </a:defRPr>
+                      </a:pPr>
                       <a:r>
-                        <a:rPr lang="en-GB" sz="1600">
-                          <a:effectLst/>
-                        </a:rPr>
-                        <a:t>Prometheus (Metrics), Grafana (Dashboards), AlertManager, Health Checks</a:t>
+                        <a:rPr sz="1000"/>
+                        <a:t>VPC: 10.0.0.0/16</a:t>
+                      </a:r>
+                    </a:p>
+                    <a:p>
+                      <a:r>
+                        <a:rPr sz="1000"/>
+                        <a:t>Public Subnet: Internet access via NAT Gateway</a:t>
+                      </a:r>
+                    </a:p>
+                    <a:p>
+                      <a:r>
+                        <a:rPr sz="1000"/>
+                        <a:t>Private Subnet: Worker nodes for security</a:t>
+                      </a:r>
+                    </a:p>
+                    <a:p>
+                      <a:r>
+                        <a:rPr sz="1000"/>
+                        <a:t>Load Balancer: External access to Kibana, Grafana, Prometheus</a:t>
                       </a:r>
                     </a:p>
                   </a:txBody>
-                  <a:tcPr marL="53816" marR="53816" marT="53816" marB="53816" anchor="ctr">
-                    <a:lnL>
-                      <a:noFill/>
-                    </a:lnL>
-                    <a:lnR>
-                      <a:noFill/>
-                    </a:lnR>
-                    <a:lnT w="7938" cap="flat" cmpd="sng" algn="ctr">
-                      <a:solidFill>
-                        <a:srgbClr val="525252"/>
-                      </a:solidFill>
-                      <a:prstDash val="solid"/>
-                      <a:round/>
-                      <a:headEnd type="none" w="med" len="med"/>
-                      <a:tailEnd type="none" w="med" len="med"/>
-                    </a:lnT>
-                    <a:lnB w="7938" cap="flat" cmpd="sng" algn="ctr">
-                      <a:solidFill>
-                        <a:srgbClr val="525252"/>
-                      </a:solidFill>
-                      <a:prstDash val="solid"/>
-                      <a:round/>
-                      <a:headEnd type="none" w="med" len="med"/>
-                      <a:tailEnd type="none" w="med" len="med"/>
-                    </a:lnB>
-                    <a:noFill/>
-                  </a:tcPr>
+                  <a:tcPr/>
                 </a:tc>
                 <a:extLst>
                   <a:ext uri="{0D108BD9-81ED-4DB2-BD59-A6C34878D82A}">
-                    <a16:rowId xmlns:a16="http://schemas.microsoft.com/office/drawing/2014/main" val="2010460657"/>
+                    <a16:rowId xmlns:a16="http://schemas.microsoft.com/office/drawing/2014/main" val="10004"/>
                   </a:ext>
                 </a:extLst>
               </a:tr>
-              <a:tr h="875463">
+              <a:tr h="486037">
                 <a:tc>
                   <a:txBody>
                     <a:bodyPr/>
                     <a:lstStyle/>
                     <a:p>
+                      <a:pPr>
+                        <a:defRPr sz="1100">
+                          <a:solidFill>
+                            <a:srgbClr val="000000"/>
+                          </a:solidFill>
+                        </a:defRPr>
+                      </a:pPr>
                       <a:r>
-                        <a:rPr lang="en-GB" sz="1600" b="1">
-                          <a:effectLst/>
-                        </a:rPr>
-                        <a:t>🔒 Security &amp; Operations</a:t>
+                        <a:rPr sz="1000"/>
+                        <a:t>Storage</a:t>
                       </a:r>
-                      <a:endParaRPr lang="en-GB" sz="1600">
-                        <a:effectLst/>
-                      </a:endParaRPr>
                     </a:p>
                   </a:txBody>
-                  <a:tcPr marL="77494" marR="53816" marT="53816" marB="53816" anchor="ctr">
-                    <a:lnL>
-                      <a:noFill/>
-                    </a:lnL>
-                    <a:lnR>
-                      <a:noFill/>
-                    </a:lnR>
-                    <a:lnT w="7938" cap="flat" cmpd="sng" algn="ctr">
-                      <a:solidFill>
-                        <a:srgbClr val="525252"/>
-                      </a:solidFill>
-                      <a:prstDash val="solid"/>
-                      <a:round/>
-                      <a:headEnd type="none" w="med" len="med"/>
-                      <a:tailEnd type="none" w="med" len="med"/>
-                    </a:lnT>
-                    <a:lnB w="7938" cap="flat" cmpd="sng" algn="ctr">
-                      <a:solidFill>
-                        <a:srgbClr val="525252"/>
-                      </a:solidFill>
-                      <a:prstDash val="solid"/>
-                      <a:round/>
-                      <a:headEnd type="none" w="med" len="med"/>
-                      <a:tailEnd type="none" w="med" len="med"/>
-                    </a:lnB>
-                    <a:noFill/>
-                  </a:tcPr>
+                  <a:tcPr/>
                 </a:tc>
                 <a:tc>
                   <a:txBody>
                     <a:bodyPr/>
                     <a:lstStyle/>
                     <a:p>
+                      <a:pPr>
+                        <a:defRPr sz="1100">
+                          <a:solidFill>
+                            <a:srgbClr val="000000"/>
+                          </a:solidFill>
+                        </a:defRPr>
+                      </a:pPr>
                       <a:r>
-                        <a:rPr lang="en-GB" sz="1600" dirty="0">
-                          <a:effectLst/>
-                        </a:rPr>
-                        <a:t>RBAC, Network Policies, S3 Automated Backups, IAM Integration</a:t>
+                        <a:rPr sz="1000" dirty="0"/>
+                        <a:t>EBS Volumes: gp2 storage for persistent data</a:t>
+                      </a:r>
+                    </a:p>
+                    <a:p>
+                      <a:r>
+                        <a:rPr sz="1000" dirty="0"/>
+                        <a:t>Elasticsearch: 50 GiB for data storage</a:t>
+                      </a:r>
+                    </a:p>
+                    <a:p>
+                      <a:r>
+                        <a:rPr sz="1000" dirty="0"/>
+                        <a:t>Kibana: 5 GiB for configuration and logs</a:t>
                       </a:r>
                     </a:p>
                   </a:txBody>
-                  <a:tcPr marL="53816" marR="53816" marT="53816" marB="53816" anchor="ctr">
-                    <a:lnL>
-                      <a:noFill/>
-                    </a:lnL>
-                    <a:lnR>
-                      <a:noFill/>
-                    </a:lnR>
-                    <a:lnT w="7938" cap="flat" cmpd="sng" algn="ctr">
-                      <a:solidFill>
-                        <a:srgbClr val="525252"/>
-                      </a:solidFill>
-                      <a:prstDash val="solid"/>
-                      <a:round/>
-                      <a:headEnd type="none" w="med" len="med"/>
-                      <a:tailEnd type="none" w="med" len="med"/>
-                    </a:lnT>
-                    <a:lnB w="7938" cap="flat" cmpd="sng" algn="ctr">
-                      <a:solidFill>
-                        <a:srgbClr val="525252"/>
-                      </a:solidFill>
-                      <a:prstDash val="solid"/>
-                      <a:round/>
-                      <a:headEnd type="none" w="med" len="med"/>
-                      <a:tailEnd type="none" w="med" len="med"/>
-                    </a:lnB>
-                    <a:noFill/>
-                  </a:tcPr>
+                  <a:tcPr/>
                 </a:tc>
                 <a:extLst>
                   <a:ext uri="{0D108BD9-81ED-4DB2-BD59-A6C34878D82A}">
-                    <a16:rowId xmlns:a16="http://schemas.microsoft.com/office/drawing/2014/main" val="1959221666"/>
+                    <a16:rowId xmlns:a16="http://schemas.microsoft.com/office/drawing/2014/main" val="10005"/>
+                  </a:ext>
+                </a:extLst>
+              </a:tr>
+              <a:tr h="816175">
+                <a:tc>
+                  <a:txBody>
+                    <a:bodyPr/>
+                    <a:lstStyle/>
+                    <a:p>
+                      <a:pPr>
+                        <a:defRPr sz="1100">
+                          <a:solidFill>
+                            <a:srgbClr val="000000"/>
+                          </a:solidFill>
+                        </a:defRPr>
+                      </a:pPr>
+                      <a:r>
+                        <a:rPr sz="1000"/>
+                        <a:t>Cost Optimization Benefits</a:t>
+                      </a:r>
+                    </a:p>
+                  </a:txBody>
+                  <a:tcPr/>
+                </a:tc>
+                <a:tc>
+                  <a:txBody>
+                    <a:bodyPr/>
+                    <a:lstStyle/>
+                    <a:p>
+                      <a:pPr>
+                        <a:defRPr sz="1100">
+                          <a:solidFill>
+                            <a:srgbClr val="000000"/>
+                          </a:solidFill>
+                        </a:defRPr>
+                      </a:pPr>
+                      <a:r>
+                        <a:rPr sz="1000" dirty="0"/>
+                        <a:t>Single replicas → Faster deployment, lower complexity</a:t>
+                      </a:r>
+                    </a:p>
+                    <a:p>
+                      <a:r>
+                        <a:rPr sz="1000" dirty="0"/>
+                        <a:t>Optimized instance types</a:t>
+                      </a:r>
+                      <a:endParaRPr lang="en-GB" sz="1000" dirty="0"/>
+                    </a:p>
+                    <a:p>
+                      <a:r>
+                        <a:rPr sz="1000" dirty="0"/>
+                        <a:t>storage</a:t>
+                      </a:r>
+                      <a:endParaRPr lang="en-GB" sz="1000" dirty="0"/>
+                    </a:p>
+                    <a:p>
+                      <a:r>
+                        <a:rPr sz="1000" dirty="0"/>
+                        <a:t>Simplified architecture → Easier troubleshooting</a:t>
+                      </a:r>
+                    </a:p>
+                  </a:txBody>
+                  <a:tcPr/>
+                </a:tc>
+                <a:extLst>
+                  <a:ext uri="{0D108BD9-81ED-4DB2-BD59-A6C34878D82A}">
+                    <a16:rowId xmlns:a16="http://schemas.microsoft.com/office/drawing/2014/main" val="10006"/>
+                  </a:ext>
+                </a:extLst>
+              </a:tr>
+              <a:tr h="220092">
+                <a:tc>
+                  <a:txBody>
+                    <a:bodyPr/>
+                    <a:lstStyle/>
+                    <a:p>
+                      <a:pPr>
+                        <a:defRPr sz="1100">
+                          <a:solidFill>
+                            <a:srgbClr val="000000"/>
+                          </a:solidFill>
+                        </a:defRPr>
+                      </a:pPr>
+                      <a:r>
+                        <a:rPr sz="1000"/>
+                        <a:t>Security Features</a:t>
+                      </a:r>
+                    </a:p>
+                  </a:txBody>
+                  <a:tcPr/>
+                </a:tc>
+                <a:tc>
+                  <a:txBody>
+                    <a:bodyPr/>
+                    <a:lstStyle/>
+                    <a:p>
+                      <a:pPr>
+                        <a:defRPr sz="1100">
+                          <a:solidFill>
+                            <a:srgbClr val="000000"/>
+                          </a:solidFill>
+                        </a:defRPr>
+                      </a:pPr>
+                      <a:r>
+                        <a:rPr sz="1000" dirty="0"/>
+                        <a:t>Private subnets for worker nodes</a:t>
+                      </a:r>
+                    </a:p>
+                  </a:txBody>
+                  <a:tcPr/>
+                </a:tc>
+                <a:extLst>
+                  <a:ext uri="{0D108BD9-81ED-4DB2-BD59-A6C34878D82A}">
+                    <a16:rowId xmlns:a16="http://schemas.microsoft.com/office/drawing/2014/main" val="10007"/>
                   </a:ext>
                 </a:extLst>
               </a:tr>
@@ -25880,39 +26151,6 @@
           </a:p>
         </p:txBody>
       </p:sp>
-      <p:pic>
-        <p:nvPicPr>
-          <p:cNvPr id="15" name="Picture 14" descr="A black screen with white text&#10;&#10;AI-generated content may be incorrect.">
-            <a:extLst>
-              <a:ext uri="{FF2B5EF4-FFF2-40B4-BE49-F238E27FC236}">
-                <a16:creationId xmlns:a16="http://schemas.microsoft.com/office/drawing/2014/main" id="{DC40FA16-51C7-9B30-8A4D-165576EEACC9}"/>
-              </a:ext>
-            </a:extLst>
-          </p:cNvPr>
-          <p:cNvPicPr>
-            <a:picLocks noChangeAspect="1"/>
-          </p:cNvPicPr>
-          <p:nvPr/>
-        </p:nvPicPr>
-        <p:blipFill>
-          <a:blip r:embed="rId2">
-            <a:alphaModFix amt="40000"/>
-          </a:blip>
-          <a:srcRect b="15414"/>
-          <a:stretch>
-            <a:fillRect/>
-          </a:stretch>
-        </p:blipFill>
-        <p:spPr>
-          <a:xfrm>
-            <a:off x="20" y="10"/>
-            <a:ext cx="12191980" cy="6857990"/>
-          </a:xfrm>
-          <a:prstGeom prst="rect">
-            <a:avLst/>
-          </a:prstGeom>
-        </p:spPr>
-      </p:pic>
       <p:sp>
         <p:nvSpPr>
           <p:cNvPr id="63" name="Rectangle 62">
@@ -26080,6 +26318,36 @@
           </a:p>
         </p:txBody>
       </p:sp>
+      <p:pic>
+        <p:nvPicPr>
+          <p:cNvPr id="42" name="Picture 41">
+            <a:extLst>
+              <a:ext uri="{FF2B5EF4-FFF2-40B4-BE49-F238E27FC236}">
+                <a16:creationId xmlns:a16="http://schemas.microsoft.com/office/drawing/2014/main" id="{81D310FB-4A75-F37F-7ECF-AC1A1E01000A}"/>
+              </a:ext>
+            </a:extLst>
+          </p:cNvPr>
+          <p:cNvPicPr>
+            <a:picLocks noChangeAspect="1"/>
+          </p:cNvPicPr>
+          <p:nvPr/>
+        </p:nvPicPr>
+        <p:blipFill>
+          <a:blip r:embed="rId2"/>
+          <a:stretch>
+            <a:fillRect/>
+          </a:stretch>
+        </p:blipFill>
+        <p:spPr>
+          <a:xfrm>
+            <a:off x="1073358" y="-14758"/>
+            <a:ext cx="10287000" cy="6858000"/>
+          </a:xfrm>
+          <a:prstGeom prst="rect">
+            <a:avLst/>
+          </a:prstGeom>
+        </p:spPr>
+      </p:pic>
     </p:spTree>
     <p:extLst>
       <p:ext uri="{BB962C8B-B14F-4D97-AF65-F5344CB8AC3E}">
@@ -27067,10 +27335,10 @@
                     <a:lstStyle/>
                     <a:p>
                       <a:r>
-                        <a:rPr lang="en-GB" sz="800" b="1"/>
+                        <a:rPr lang="en-GB" sz="800" b="1" dirty="0"/>
                         <a:t>Section</a:t>
                       </a:r>
-                      <a:endParaRPr lang="en-GB" sz="800"/>
+                      <a:endParaRPr lang="en-GB" sz="800" dirty="0"/>
                     </a:p>
                   </a:txBody>
                   <a:tcPr marL="40907" marR="40907" marT="20454" marB="20454" anchor="ctr">
@@ -27318,7 +27586,7 @@
                     <a:lstStyle/>
                     <a:p>
                       <a:r>
-                        <a:rPr lang="en-GB" sz="800"/>
+                        <a:rPr lang="en-GB" sz="800" dirty="0"/>
                         <a:t>DNS-compatible names recommended</a:t>
                       </a:r>
                     </a:p>
@@ -27592,17 +27860,19 @@
         </p:nvSpPr>
         <p:spPr>
           <a:xfrm>
-            <a:off x="2592925" y="306333"/>
-            <a:ext cx="8911687" cy="1280890"/>
+            <a:off x="1794095" y="123453"/>
+            <a:ext cx="7965855" cy="625847"/>
           </a:xfrm>
         </p:spPr>
         <p:txBody>
-          <a:bodyPr/>
+          <a:bodyPr>
+            <a:normAutofit fontScale="90000"/>
+          </a:bodyPr>
           <a:lstStyle/>
           <a:p>
             <a:r>
-              <a:rPr lang="en-GB" b="1" dirty="0"/>
-              <a:t>Deployment &amp; Monitoring</a:t>
+              <a:rPr lang="en-GB" sz="2200" b="1" dirty="0"/>
+              <a:t>Quick Start Guide - Infrastructure as Code Deployment</a:t>
             </a:r>
             <a:br>
               <a:rPr lang="en-GB" dirty="0"/>
@@ -27613,80 +27883,680 @@
       </p:sp>
       <p:sp>
         <p:nvSpPr>
-          <p:cNvPr id="5" name="Content Placeholder 4">
+          <p:cNvPr id="25" name="TextBox 24">
             <a:extLst>
               <a:ext uri="{FF2B5EF4-FFF2-40B4-BE49-F238E27FC236}">
-                <a16:creationId xmlns:a16="http://schemas.microsoft.com/office/drawing/2014/main" id="{A126CC3A-867D-BAFE-1202-C5942ACF15C3}"/>
+                <a16:creationId xmlns:a16="http://schemas.microsoft.com/office/drawing/2014/main" id="{F2418F1E-B893-1B9B-9D8B-2EFB0DF6ED88}"/>
+              </a:ext>
+            </a:extLst>
+          </p:cNvPr>
+          <p:cNvSpPr txBox="1"/>
+          <p:nvPr/>
+        </p:nvSpPr>
+        <p:spPr>
+          <a:xfrm>
+            <a:off x="1741488" y="564634"/>
+            <a:ext cx="2157412" cy="369332"/>
+          </a:xfrm>
+          <a:prstGeom prst="rect">
+            <a:avLst/>
+          </a:prstGeom>
+          <a:noFill/>
+        </p:spPr>
+        <p:txBody>
+          <a:bodyPr wrap="square">
+            <a:spAutoFit/>
+          </a:bodyPr>
+          <a:lstStyle/>
+          <a:p>
+            <a:r>
+              <a:rPr lang="en-GB" dirty="0"/>
+              <a:t>1. Clone &amp; Setup</a:t>
+            </a:r>
+          </a:p>
+        </p:txBody>
+      </p:sp>
+      <p:pic>
+        <p:nvPicPr>
+          <p:cNvPr id="29" name="Picture 28">
+            <a:extLst>
+              <a:ext uri="{FF2B5EF4-FFF2-40B4-BE49-F238E27FC236}">
+                <a16:creationId xmlns:a16="http://schemas.microsoft.com/office/drawing/2014/main" id="{1EEF5B64-999D-FE43-B5F9-043C5DFE696D}"/>
+              </a:ext>
+            </a:extLst>
+          </p:cNvPr>
+          <p:cNvPicPr>
+            <a:picLocks noChangeAspect="1"/>
+          </p:cNvPicPr>
+          <p:nvPr/>
+        </p:nvPicPr>
+        <p:blipFill>
+          <a:blip r:embed="rId2"/>
+          <a:stretch>
+            <a:fillRect/>
+          </a:stretch>
+        </p:blipFill>
+        <p:spPr>
+          <a:xfrm>
+            <a:off x="1666760" y="933966"/>
+            <a:ext cx="6604604" cy="676431"/>
+          </a:xfrm>
+          <a:prstGeom prst="rect">
+            <a:avLst/>
+          </a:prstGeom>
+        </p:spPr>
+      </p:pic>
+      <p:sp>
+        <p:nvSpPr>
+          <p:cNvPr id="31" name="Rectangle 4">
+            <a:extLst>
+              <a:ext uri="{FF2B5EF4-FFF2-40B4-BE49-F238E27FC236}">
+                <a16:creationId xmlns:a16="http://schemas.microsoft.com/office/drawing/2014/main" id="{FD7065DF-2366-EA80-270C-D9452291A7F9}"/>
               </a:ext>
             </a:extLst>
           </p:cNvPr>
           <p:cNvSpPr>
-            <a:spLocks noGrp="1"/>
+            <a:spLocks noChangeArrowheads="1"/>
           </p:cNvSpPr>
-          <p:nvPr>
-            <p:ph idx="1"/>
-          </p:nvPr>
+          <p:nvPr/>
         </p:nvSpPr>
-        <p:spPr>
+        <p:spPr bwMode="auto">
           <a:xfrm>
-            <a:off x="1567543" y="964194"/>
-            <a:ext cx="9770965" cy="5319039"/>
+            <a:off x="1339850" y="1818839"/>
+            <a:ext cx="8282139" cy="2585323"/>
           </a:xfrm>
+          <a:prstGeom prst="rect">
+            <a:avLst/>
+          </a:prstGeom>
+          <a:noFill/>
+          <a:ln>
+            <a:noFill/>
+          </a:ln>
+          <a:effectLst/>
+          <a:extLst>
+            <a:ext uri="{909E8E84-426E-40DD-AFC4-6F175D3DCCD1}">
+              <a14:hiddenFill xmlns:a14="http://schemas.microsoft.com/office/drawing/2010/main">
+                <a:solidFill>
+                  <a:schemeClr val="accent1"/>
+                </a:solidFill>
+              </a14:hiddenFill>
+            </a:ext>
+            <a:ext uri="{91240B29-F687-4F45-9708-019B960494DF}">
+              <a14:hiddenLine xmlns:a14="http://schemas.microsoft.com/office/drawing/2010/main" w="9525">
+                <a:solidFill>
+                  <a:schemeClr val="tx1"/>
+                </a:solidFill>
+                <a:miter lim="800000"/>
+                <a:headEnd/>
+                <a:tailEnd/>
+              </a14:hiddenLine>
+            </a:ext>
+            <a:ext uri="{AF507438-7753-43E0-B8FC-AC1667EBCBE1}">
+              <a14:hiddenEffects xmlns:a14="http://schemas.microsoft.com/office/drawing/2010/main">
+                <a:effectLst>
+                  <a:outerShdw dist="35921" dir="2700000" algn="ctr" rotWithShape="0">
+                    <a:schemeClr val="bg2"/>
+                  </a:outerShdw>
+                </a:effectLst>
+              </a14:hiddenEffects>
+            </a:ext>
+          </a:extLst>
         </p:spPr>
         <p:txBody>
-          <a:bodyPr>
-            <a:normAutofit/>
+          <a:bodyPr vert="horz" wrap="none" lIns="91440" tIns="45720" rIns="91440" bIns="45720" numCol="1" anchor="ctr" anchorCtr="0" compatLnSpc="1">
+            <a:prstTxWarp prst="textNoShape">
+              <a:avLst/>
+            </a:prstTxWarp>
+            <a:spAutoFit/>
           </a:bodyPr>
           <a:lstStyle/>
           <a:p>
-            <a:endParaRPr lang="en-GB" dirty="0"/>
-          </a:p>
-          <a:p>
-            <a:endParaRPr lang="en-GB" dirty="0"/>
-          </a:p>
-          <a:p>
+            <a:pPr marL="0" marR="0" lvl="0" indent="0" algn="l" defTabSz="914400" rtl="0" eaLnBrk="0" fontAlgn="base" latinLnBrk="0" hangingPunct="0">
+              <a:lnSpc>
+                <a:spcPct val="100000"/>
+              </a:lnSpc>
+              <a:spcBef>
+                <a:spcPct val="0"/>
+              </a:spcBef>
+              <a:spcAft>
+                <a:spcPct val="0"/>
+              </a:spcAft>
+              <a:buClrTx/>
+              <a:buSzTx/>
+              <a:buFontTx/>
+              <a:buNone/>
+              <a:tabLst/>
+            </a:pPr>
             <a:r>
-              <a:rPr lang="en-GB" dirty="0"/>
-              <a:t>Git clone</a:t>
+              <a:rPr kumimoji="0" lang="en-US" altLang="en-US" sz="1800" b="1" i="0" u="none" strike="noStrike" cap="none" normalizeH="0" baseline="0" dirty="0">
+                <a:ln>
+                  <a:noFill/>
+                </a:ln>
+                <a:solidFill>
+                  <a:schemeClr val="tx1"/>
+                </a:solidFill>
+                <a:effectLst/>
+                <a:latin typeface="Arial" panose="020B0604020202020204" pitchFamily="34" charset="0"/>
+              </a:rPr>
+              <a:t>2. Automated Script Workflow</a:t>
+            </a:r>
+            <a:br>
+              <a:rPr kumimoji="0" lang="en-US" altLang="en-US" sz="1800" b="0" i="0" u="none" strike="noStrike" cap="none" normalizeH="0" baseline="0" dirty="0">
+                <a:ln>
+                  <a:noFill/>
+                </a:ln>
+                <a:solidFill>
+                  <a:schemeClr val="tx1"/>
+                </a:solidFill>
+                <a:effectLst/>
+                <a:latin typeface="Arial" panose="020B0604020202020204" pitchFamily="34" charset="0"/>
+              </a:rPr>
+            </a:br>
+            <a:r>
+              <a:rPr kumimoji="0" lang="en-US" altLang="en-US" sz="1800" b="0" i="0" u="none" strike="noStrike" cap="none" normalizeH="0" baseline="0" dirty="0">
+                <a:ln>
+                  <a:noFill/>
+                </a:ln>
+                <a:solidFill>
+                  <a:schemeClr val="tx1"/>
+                </a:solidFill>
+                <a:effectLst/>
+                <a:latin typeface="Arial" panose="020B0604020202020204" pitchFamily="34" charset="0"/>
+              </a:rPr>
+              <a:t>The provided script will automatically:</a:t>
             </a:r>
           </a:p>
           <a:p>
-            <a:endParaRPr lang="en-GB" dirty="0"/>
-          </a:p>
-          <a:p>
-            <a:pPr marL="0" indent="0">
-              <a:buNone/>
+            <a:pPr marL="0" marR="0" lvl="0" indent="0" algn="l" defTabSz="914400" rtl="0" eaLnBrk="0" fontAlgn="base" latinLnBrk="0" hangingPunct="0">
+              <a:lnSpc>
+                <a:spcPct val="100000"/>
+              </a:lnSpc>
+              <a:spcBef>
+                <a:spcPct val="0"/>
+              </a:spcBef>
+              <a:spcAft>
+                <a:spcPct val="0"/>
+              </a:spcAft>
+              <a:buClrTx/>
+              <a:buSzTx/>
+              <a:buFontTx/>
+              <a:buAutoNum type="arabicPeriod"/>
+              <a:tabLst/>
             </a:pPr>
             <a:r>
-              <a:rPr lang="en-GB" dirty="0"/>
-              <a:t>Script </a:t>
+              <a:rPr kumimoji="0" lang="en-US" altLang="en-US" sz="1800" b="0" i="0" u="none" strike="noStrike" cap="none" normalizeH="0" baseline="0" dirty="0">
+                <a:ln>
+                  <a:noFill/>
+                </a:ln>
+                <a:solidFill>
+                  <a:schemeClr val="tx1"/>
+                </a:solidFill>
+                <a:effectLst/>
+                <a:latin typeface="Arial" panose="020B0604020202020204" pitchFamily="34" charset="0"/>
+              </a:rPr>
+              <a:t>✅ </a:t>
+            </a:r>
+            <a:r>
+              <a:rPr kumimoji="0" lang="en-US" altLang="en-US" sz="1800" b="1" i="0" u="none" strike="noStrike" cap="none" normalizeH="0" baseline="0" dirty="0">
+                <a:ln>
+                  <a:noFill/>
+                </a:ln>
+                <a:solidFill>
+                  <a:schemeClr val="tx1"/>
+                </a:solidFill>
+                <a:effectLst/>
+                <a:latin typeface="Arial" panose="020B0604020202020204" pitchFamily="34" charset="0"/>
+              </a:rPr>
+              <a:t>Test Prerequisites</a:t>
+            </a:r>
+            <a:r>
+              <a:rPr kumimoji="0" lang="en-US" altLang="en-US" sz="1800" b="0" i="0" u="none" strike="noStrike" cap="none" normalizeH="0" baseline="0" dirty="0">
+                <a:ln>
+                  <a:noFill/>
+                </a:ln>
+                <a:solidFill>
+                  <a:schemeClr val="tx1"/>
+                </a:solidFill>
+                <a:effectLst/>
+                <a:latin typeface="Arial" panose="020B0604020202020204" pitchFamily="34" charset="0"/>
+              </a:rPr>
+              <a:t> – Check AWS CLI, Terraform, and </a:t>
+            </a:r>
+            <a:r>
+              <a:rPr kumimoji="0" lang="en-US" altLang="en-US" sz="1800" b="0" i="0" u="none" strike="noStrike" cap="none" normalizeH="0" baseline="0" dirty="0" err="1">
+                <a:ln>
+                  <a:noFill/>
+                </a:ln>
+                <a:solidFill>
+                  <a:schemeClr val="tx1"/>
+                </a:solidFill>
+                <a:effectLst/>
+                <a:latin typeface="Arial" panose="020B0604020202020204" pitchFamily="34" charset="0"/>
+              </a:rPr>
+              <a:t>kubectl</a:t>
+            </a:r>
+            <a:r>
+              <a:rPr kumimoji="0" lang="en-US" altLang="en-US" sz="1800" b="0" i="0" u="none" strike="noStrike" cap="none" normalizeH="0" baseline="0" dirty="0">
+                <a:ln>
+                  <a:noFill/>
+                </a:ln>
+                <a:solidFill>
+                  <a:schemeClr val="tx1"/>
+                </a:solidFill>
+                <a:effectLst/>
+                <a:latin typeface="Arial" panose="020B0604020202020204" pitchFamily="34" charset="0"/>
+              </a:rPr>
+              <a:t> installation.</a:t>
             </a:r>
           </a:p>
           <a:p>
+            <a:pPr marL="0" marR="0" lvl="0" indent="0" algn="l" defTabSz="914400" rtl="0" eaLnBrk="0" fontAlgn="base" latinLnBrk="0" hangingPunct="0">
+              <a:lnSpc>
+                <a:spcPct val="100000"/>
+              </a:lnSpc>
+              <a:spcBef>
+                <a:spcPct val="0"/>
+              </a:spcBef>
+              <a:spcAft>
+                <a:spcPct val="0"/>
+              </a:spcAft>
+              <a:buClrTx/>
+              <a:buSzTx/>
+              <a:buFontTx/>
+              <a:buAutoNum type="arabicPeriod" startAt="2"/>
+              <a:tabLst/>
+            </a:pPr>
             <a:r>
-              <a:rPr lang="en-GB" dirty="0"/>
-              <a:t>cd Elasticsearch-Terraform/terraform/</a:t>
+              <a:rPr kumimoji="0" lang="en-US" altLang="en-US" sz="1800" b="0" i="0" u="none" strike="noStrike" cap="none" normalizeH="0" baseline="0" dirty="0">
+                <a:ln>
+                  <a:noFill/>
+                </a:ln>
+                <a:solidFill>
+                  <a:schemeClr val="tx1"/>
+                </a:solidFill>
+                <a:effectLst/>
+                <a:latin typeface="Arial" panose="020B0604020202020204" pitchFamily="34" charset="0"/>
+              </a:rPr>
+              <a:t>✅ </a:t>
+            </a:r>
+            <a:r>
+              <a:rPr kumimoji="0" lang="en-US" altLang="en-US" sz="1800" b="1" i="0" u="none" strike="noStrike" cap="none" normalizeH="0" baseline="0" dirty="0">
+                <a:ln>
+                  <a:noFill/>
+                </a:ln>
+                <a:solidFill>
+                  <a:schemeClr val="tx1"/>
+                </a:solidFill>
+                <a:effectLst/>
+                <a:latin typeface="Arial" panose="020B0604020202020204" pitchFamily="34" charset="0"/>
+              </a:rPr>
+              <a:t>Test Configuration</a:t>
+            </a:r>
+            <a:r>
+              <a:rPr kumimoji="0" lang="en-US" altLang="en-US" sz="1800" b="0" i="0" u="none" strike="noStrike" cap="none" normalizeH="0" baseline="0" dirty="0">
+                <a:ln>
+                  <a:noFill/>
+                </a:ln>
+                <a:solidFill>
+                  <a:schemeClr val="tx1"/>
+                </a:solidFill>
+                <a:effectLst/>
+                <a:latin typeface="Arial" panose="020B0604020202020204" pitchFamily="34" charset="0"/>
+              </a:rPr>
+              <a:t> – Validate setup and create </a:t>
+            </a:r>
+            <a:r>
+              <a:rPr kumimoji="0" lang="en-US" altLang="en-US" sz="1000" b="0" i="0" u="none" strike="noStrike" cap="none" normalizeH="0" baseline="0" dirty="0" err="1">
+                <a:ln>
+                  <a:noFill/>
+                </a:ln>
+                <a:solidFill>
+                  <a:schemeClr val="tx1"/>
+                </a:solidFill>
+                <a:effectLst/>
+                <a:latin typeface="Arial Unicode MS"/>
+              </a:rPr>
+              <a:t>terraform.tfvars</a:t>
+            </a:r>
+            <a:r>
+              <a:rPr kumimoji="0" lang="en-US" altLang="en-US" sz="800" b="0" i="0" u="none" strike="noStrike" cap="none" normalizeH="0" baseline="0" dirty="0">
+                <a:ln>
+                  <a:noFill/>
+                </a:ln>
+                <a:solidFill>
+                  <a:schemeClr val="tx1"/>
+                </a:solidFill>
+                <a:effectLst/>
+              </a:rPr>
+              <a:t>.</a:t>
+            </a:r>
+            <a:endParaRPr kumimoji="0" lang="en-US" altLang="en-US" sz="1800" b="0" i="0" u="none" strike="noStrike" cap="none" normalizeH="0" baseline="0" dirty="0">
+              <a:ln>
+                <a:noFill/>
+              </a:ln>
+              <a:solidFill>
+                <a:schemeClr val="tx1"/>
+              </a:solidFill>
+              <a:effectLst/>
+              <a:latin typeface="Arial" panose="020B0604020202020204" pitchFamily="34" charset="0"/>
+            </a:endParaRPr>
+          </a:p>
+          <a:p>
+            <a:pPr marL="0" marR="0" lvl="0" indent="0" algn="l" defTabSz="914400" rtl="0" eaLnBrk="0" fontAlgn="base" latinLnBrk="0" hangingPunct="0">
+              <a:lnSpc>
+                <a:spcPct val="100000"/>
+              </a:lnSpc>
+              <a:spcBef>
+                <a:spcPct val="0"/>
+              </a:spcBef>
+              <a:spcAft>
+                <a:spcPct val="0"/>
+              </a:spcAft>
+              <a:buClrTx/>
+              <a:buSzTx/>
+              <a:buFontTx/>
+              <a:buAutoNum type="arabicPeriod" startAt="3"/>
+              <a:tabLst/>
+            </a:pPr>
+            <a:r>
+              <a:rPr kumimoji="0" lang="en-US" altLang="en-US" sz="1800" b="0" i="0" u="none" strike="noStrike" cap="none" normalizeH="0" baseline="0" dirty="0">
+                <a:ln>
+                  <a:noFill/>
+                </a:ln>
+                <a:solidFill>
+                  <a:schemeClr val="tx1"/>
+                </a:solidFill>
+                <a:effectLst/>
+                <a:latin typeface="Arial" panose="020B0604020202020204" pitchFamily="34" charset="0"/>
+              </a:rPr>
+              <a:t>✅ </a:t>
+            </a:r>
+            <a:r>
+              <a:rPr kumimoji="0" lang="en-US" altLang="en-US" sz="1800" b="1" i="0" u="none" strike="noStrike" cap="none" normalizeH="0" baseline="0" dirty="0">
+                <a:ln>
+                  <a:noFill/>
+                </a:ln>
+                <a:solidFill>
+                  <a:schemeClr val="tx1"/>
+                </a:solidFill>
+                <a:effectLst/>
+                <a:latin typeface="Arial" panose="020B0604020202020204" pitchFamily="34" charset="0"/>
+              </a:rPr>
+              <a:t>Deploy Infrastructure</a:t>
+            </a:r>
+            <a:r>
+              <a:rPr kumimoji="0" lang="en-US" altLang="en-US" sz="1800" b="0" i="0" u="none" strike="noStrike" cap="none" normalizeH="0" baseline="0" dirty="0">
+                <a:ln>
+                  <a:noFill/>
+                </a:ln>
+                <a:solidFill>
+                  <a:schemeClr val="tx1"/>
+                </a:solidFill>
+                <a:effectLst/>
+                <a:latin typeface="Arial" panose="020B0604020202020204" pitchFamily="34" charset="0"/>
+              </a:rPr>
+              <a:t> – Run </a:t>
             </a:r>
           </a:p>
           <a:p>
+            <a:pPr marL="0" marR="0" lvl="0" indent="0" algn="l" defTabSz="914400" rtl="0" eaLnBrk="0" fontAlgn="base" latinLnBrk="0" hangingPunct="0">
+              <a:lnSpc>
+                <a:spcPct val="100000"/>
+              </a:lnSpc>
+              <a:spcBef>
+                <a:spcPct val="0"/>
+              </a:spcBef>
+              <a:spcAft>
+                <a:spcPct val="0"/>
+              </a:spcAft>
+              <a:buClrTx/>
+              <a:buSzTx/>
+              <a:buFontTx/>
+              <a:buAutoNum type="arabicPeriod" startAt="3"/>
+              <a:tabLst/>
+            </a:pPr>
             <a:r>
-              <a:rPr lang="en-GB" dirty="0"/>
-              <a:t>terraform </a:t>
+              <a:rPr kumimoji="0" lang="en-US" altLang="en-US" sz="1800" b="0" i="0" u="none" strike="noStrike" cap="none" normalizeH="0" baseline="0" dirty="0">
+                <a:ln>
+                  <a:noFill/>
+                </a:ln>
+                <a:solidFill>
+                  <a:schemeClr val="tx1"/>
+                </a:solidFill>
+                <a:effectLst/>
+                <a:latin typeface="Arial" panose="020B0604020202020204" pitchFamily="34" charset="0"/>
+              </a:rPr>
+              <a:t>✅ </a:t>
             </a:r>
             <a:r>
-              <a:rPr lang="en-GB" dirty="0" err="1"/>
-              <a:t>init</a:t>
+              <a:rPr kumimoji="0" lang="en-US" altLang="en-US" sz="1800" b="1" i="0" u="none" strike="noStrike" cap="none" normalizeH="0" baseline="0" dirty="0">
+                <a:ln>
+                  <a:noFill/>
+                </a:ln>
+                <a:solidFill>
+                  <a:schemeClr val="tx1"/>
+                </a:solidFill>
+                <a:effectLst/>
+                <a:latin typeface="Arial" panose="020B0604020202020204" pitchFamily="34" charset="0"/>
+              </a:rPr>
+              <a:t>Set </a:t>
             </a:r>
             <a:r>
-              <a:rPr lang="en-GB" dirty="0"/>
-              <a:t> &amp;&amp; terraform apply  # Auto-approve if desired</a:t>
+              <a:rPr kumimoji="0" lang="en-US" altLang="en-US" sz="1800" b="1" i="0" u="none" strike="noStrike" cap="none" normalizeH="0" baseline="0" dirty="0" err="1">
+                <a:ln>
+                  <a:noFill/>
+                </a:ln>
+                <a:solidFill>
+                  <a:schemeClr val="tx1"/>
+                </a:solidFill>
+                <a:effectLst/>
+                <a:latin typeface="Arial" panose="020B0604020202020204" pitchFamily="34" charset="0"/>
+              </a:rPr>
+              <a:t>kubectl</a:t>
+            </a:r>
+            <a:r>
+              <a:rPr kumimoji="0" lang="en-US" altLang="en-US" sz="1800" b="1" i="0" u="none" strike="noStrike" cap="none" normalizeH="0" baseline="0" dirty="0">
+                <a:ln>
+                  <a:noFill/>
+                </a:ln>
+                <a:solidFill>
+                  <a:schemeClr val="tx1"/>
+                </a:solidFill>
+                <a:effectLst/>
+                <a:latin typeface="Arial" panose="020B0604020202020204" pitchFamily="34" charset="0"/>
+              </a:rPr>
+              <a:t> Config</a:t>
+            </a:r>
+            <a:r>
+              <a:rPr kumimoji="0" lang="en-US" altLang="en-US" sz="1800" b="0" i="0" u="none" strike="noStrike" cap="none" normalizeH="0" baseline="0" dirty="0">
+                <a:ln>
+                  <a:noFill/>
+                </a:ln>
+                <a:solidFill>
+                  <a:schemeClr val="tx1"/>
+                </a:solidFill>
+                <a:effectLst/>
+                <a:latin typeface="Arial" panose="020B0604020202020204" pitchFamily="34" charset="0"/>
+              </a:rPr>
+              <a:t> – Configure </a:t>
+            </a:r>
+            <a:r>
+              <a:rPr kumimoji="0" lang="en-US" altLang="en-US" sz="1000" b="0" i="0" u="none" strike="noStrike" cap="none" normalizeH="0" baseline="0" dirty="0" err="1">
+                <a:ln>
+                  <a:noFill/>
+                </a:ln>
+                <a:solidFill>
+                  <a:schemeClr val="tx1"/>
+                </a:solidFill>
+                <a:effectLst/>
+                <a:latin typeface="Arial Unicode MS"/>
+              </a:rPr>
+              <a:t>kubectl</a:t>
+            </a:r>
+            <a:r>
+              <a:rPr kumimoji="0" lang="en-US" altLang="en-US" sz="800" b="0" i="0" u="none" strike="noStrike" cap="none" normalizeH="0" baseline="0" dirty="0">
+                <a:ln>
+                  <a:noFill/>
+                </a:ln>
+                <a:solidFill>
+                  <a:schemeClr val="tx1"/>
+                </a:solidFill>
+                <a:effectLst/>
+              </a:rPr>
+              <a:t> for your new cluster.</a:t>
+            </a:r>
+            <a:endParaRPr kumimoji="0" lang="en-US" altLang="en-US" sz="1800" b="0" i="0" u="none" strike="noStrike" cap="none" normalizeH="0" baseline="0" dirty="0">
+              <a:ln>
+                <a:noFill/>
+              </a:ln>
+              <a:solidFill>
+                <a:schemeClr val="tx1"/>
+              </a:solidFill>
+              <a:effectLst/>
+              <a:latin typeface="Arial" panose="020B0604020202020204" pitchFamily="34" charset="0"/>
+            </a:endParaRPr>
+          </a:p>
+          <a:p>
+            <a:pPr marL="0" marR="0" lvl="0" indent="0" algn="l" defTabSz="914400" rtl="0" eaLnBrk="0" fontAlgn="base" latinLnBrk="0" hangingPunct="0">
+              <a:lnSpc>
+                <a:spcPct val="100000"/>
+              </a:lnSpc>
+              <a:spcBef>
+                <a:spcPct val="0"/>
+              </a:spcBef>
+              <a:spcAft>
+                <a:spcPct val="0"/>
+              </a:spcAft>
+              <a:buClrTx/>
+              <a:buSzTx/>
+              <a:buFontTx/>
+              <a:buAutoNum type="arabicPeriod" startAt="5"/>
+              <a:tabLst/>
+            </a:pPr>
+            <a:r>
+              <a:rPr kumimoji="0" lang="en-US" altLang="en-US" sz="1800" b="0" i="0" u="none" strike="noStrike" cap="none" normalizeH="0" baseline="0" dirty="0">
+                <a:ln>
+                  <a:noFill/>
+                </a:ln>
+                <a:solidFill>
+                  <a:schemeClr val="tx1"/>
+                </a:solidFill>
+                <a:effectLst/>
+                <a:latin typeface="Arial" panose="020B0604020202020204" pitchFamily="34" charset="0"/>
+              </a:rPr>
+              <a:t>✅ </a:t>
+            </a:r>
+            <a:r>
+              <a:rPr kumimoji="0" lang="en-US" altLang="en-US" sz="1800" b="1" i="0" u="none" strike="noStrike" cap="none" normalizeH="0" baseline="0" dirty="0">
+                <a:ln>
+                  <a:noFill/>
+                </a:ln>
+                <a:solidFill>
+                  <a:schemeClr val="tx1"/>
+                </a:solidFill>
+                <a:effectLst/>
+                <a:latin typeface="Arial" panose="020B0604020202020204" pitchFamily="34" charset="0"/>
+              </a:rPr>
+              <a:t>Test Deployment</a:t>
+            </a:r>
+            <a:r>
+              <a:rPr kumimoji="0" lang="en-US" altLang="en-US" sz="1800" b="0" i="0" u="none" strike="noStrike" cap="none" normalizeH="0" baseline="0" dirty="0">
+                <a:ln>
+                  <a:noFill/>
+                </a:ln>
+                <a:solidFill>
+                  <a:schemeClr val="tx1"/>
+                </a:solidFill>
+                <a:effectLst/>
+                <a:latin typeface="Arial" panose="020B0604020202020204" pitchFamily="34" charset="0"/>
+              </a:rPr>
+              <a:t> – Verify pods are running.</a:t>
             </a:r>
           </a:p>
           <a:p>
-            <a:pPr marL="0" indent="0">
+            <a:pPr marL="0" marR="0" lvl="0" indent="0" algn="l" defTabSz="914400" rtl="0" eaLnBrk="0" fontAlgn="base" latinLnBrk="0" hangingPunct="0">
+              <a:lnSpc>
+                <a:spcPct val="100000"/>
+              </a:lnSpc>
+              <a:spcBef>
+                <a:spcPct val="0"/>
+              </a:spcBef>
+              <a:spcAft>
+                <a:spcPct val="0"/>
+              </a:spcAft>
+              <a:buClrTx/>
+              <a:buSzTx/>
+              <a:buFontTx/>
+              <a:buAutoNum type="arabicPeriod" startAt="6"/>
+              <a:tabLst/>
+            </a:pPr>
+            <a:r>
+              <a:rPr kumimoji="0" lang="en-US" altLang="en-US" sz="1800" b="0" i="0" u="none" strike="noStrike" cap="none" normalizeH="0" baseline="0" dirty="0">
+                <a:ln>
+                  <a:noFill/>
+                </a:ln>
+                <a:solidFill>
+                  <a:schemeClr val="tx1"/>
+                </a:solidFill>
+                <a:effectLst/>
+                <a:latin typeface="Arial" panose="020B0604020202020204" pitchFamily="34" charset="0"/>
+              </a:rPr>
+              <a:t>✅ </a:t>
+            </a:r>
+            <a:r>
+              <a:rPr kumimoji="0" lang="en-US" altLang="en-US" sz="1800" b="1" i="0" u="none" strike="noStrike" cap="none" normalizeH="0" baseline="0" dirty="0">
+                <a:ln>
+                  <a:noFill/>
+                </a:ln>
+                <a:solidFill>
+                  <a:schemeClr val="tx1"/>
+                </a:solidFill>
+                <a:effectLst/>
+                <a:latin typeface="Arial" panose="020B0604020202020204" pitchFamily="34" charset="0"/>
+              </a:rPr>
+              <a:t>Show Connection Info</a:t>
+            </a:r>
+            <a:r>
+              <a:rPr kumimoji="0" lang="en-US" altLang="en-US" sz="1800" b="0" i="0" u="none" strike="noStrike" cap="none" normalizeH="0" baseline="0" dirty="0">
+                <a:ln>
+                  <a:noFill/>
+                </a:ln>
+                <a:solidFill>
+                  <a:schemeClr val="tx1"/>
+                </a:solidFill>
+                <a:effectLst/>
+                <a:latin typeface="Arial" panose="020B0604020202020204" pitchFamily="34" charset="0"/>
+              </a:rPr>
+              <a:t> – Display URLs and access details.</a:t>
+            </a:r>
+          </a:p>
+          <a:p>
+            <a:pPr marL="0" marR="0" lvl="0" indent="0" algn="l" defTabSz="914400" rtl="0" eaLnBrk="0" fontAlgn="base" latinLnBrk="0" hangingPunct="0">
+              <a:lnSpc>
+                <a:spcPct val="100000"/>
+              </a:lnSpc>
+              <a:spcBef>
+                <a:spcPct val="0"/>
+              </a:spcBef>
+              <a:spcAft>
+                <a:spcPct val="0"/>
+              </a:spcAft>
+              <a:buClrTx/>
+              <a:buSzTx/>
+              <a:buFontTx/>
               <a:buNone/>
+              <a:tabLst/>
             </a:pPr>
-            <a:endParaRPr lang="en-GB" dirty="0"/>
+            <a:endParaRPr kumimoji="0" lang="en-US" altLang="en-US" sz="1800" b="0" i="0" u="none" strike="noStrike" cap="none" normalizeH="0" baseline="0" dirty="0">
+              <a:ln>
+                <a:noFill/>
+              </a:ln>
+              <a:solidFill>
+                <a:schemeClr val="tx1"/>
+              </a:solidFill>
+              <a:effectLst/>
+              <a:latin typeface="Arial" panose="020B0604020202020204" pitchFamily="34" charset="0"/>
+            </a:endParaRPr>
           </a:p>
         </p:txBody>
       </p:sp>

</xml_diff>